<commit_message>
Add a logo in documents
</commit_message>
<xml_diff>
--- a/Documentation/C&B Presentation.pptx
+++ b/Documentation/C&B Presentation.pptx
@@ -14419,7 +14419,7 @@
         </p:blipFill>
         <p:spPr>
           <a:xfrm>
-            <a:off x="1470740" y="1559163"/>
+            <a:off x="600305" y="1557898"/>
             <a:ext cx="872236" cy="993976"/>
           </a:xfrm>
           <a:prstGeom prst="rect">
@@ -14497,7 +14497,7 @@
         </p:blipFill>
         <p:spPr>
           <a:xfrm>
-            <a:off x="2782398" y="1127268"/>
+            <a:off x="1789979" y="1135320"/>
             <a:ext cx="1857024" cy="1857024"/>
           </a:xfrm>
           <a:prstGeom prst="rect">
@@ -14581,7 +14581,7 @@
         </p:blipFill>
         <p:spPr bwMode="auto">
           <a:xfrm>
-            <a:off x="6791325" y="1564219"/>
+            <a:off x="5888271" y="1533299"/>
             <a:ext cx="1043175" cy="1043175"/>
           </a:xfrm>
           <a:prstGeom prst="rect">
@@ -14627,7 +14627,7 @@
         </p:blipFill>
         <p:spPr>
           <a:xfrm>
-            <a:off x="2456009" y="3147417"/>
+            <a:off x="2284532" y="3147418"/>
             <a:ext cx="941959" cy="941959"/>
           </a:xfrm>
           <a:prstGeom prst="rect">
@@ -14664,7 +14664,7 @@
         </p:blipFill>
         <p:spPr bwMode="auto">
           <a:xfrm>
-            <a:off x="5078845" y="1592474"/>
+            <a:off x="4104668" y="1592474"/>
             <a:ext cx="934664" cy="934664"/>
           </a:xfrm>
           <a:prstGeom prst="rect">
@@ -14713,6 +14713,53 @@
           <a:xfrm>
             <a:off x="7741853" y="3208250"/>
             <a:ext cx="724349" cy="930198"/>
+          </a:xfrm>
+          <a:prstGeom prst="rect">
+            <a:avLst/>
+          </a:prstGeom>
+          <a:noFill/>
+          <a:extLst>
+            <a:ext uri="{909E8E84-426E-40DD-AFC4-6F175D3DCCD1}">
+              <a14:hiddenFill xmlns:a14="http://schemas.microsoft.com/office/drawing/2010/main">
+                <a:solidFill>
+                  <a:srgbClr val="FFFFFF"/>
+                </a:solidFill>
+              </a14:hiddenFill>
+            </a:ext>
+          </a:extLst>
+        </p:spPr>
+      </p:pic>
+      <p:pic>
+        <p:nvPicPr>
+          <p:cNvPr id="2" name="Picture 2" descr="Canva – Medium">
+            <a:extLst>
+              <a:ext uri="{FF2B5EF4-FFF2-40B4-BE49-F238E27FC236}">
+                <a16:creationId xmlns:a16="http://schemas.microsoft.com/office/drawing/2014/main" id="{74BA4B39-F5EB-1078-D009-5CE2338B6EAC}"/>
+              </a:ext>
+            </a:extLst>
+          </p:cNvPr>
+          <p:cNvPicPr>
+            <a:picLocks noChangeAspect="1" noChangeArrowheads="1"/>
+          </p:cNvPicPr>
+          <p:nvPr/>
+        </p:nvPicPr>
+        <p:blipFill>
+          <a:blip r:embed="rId15">
+            <a:extLst>
+              <a:ext uri="{28A0092B-C50C-407E-A947-70E740481C1C}">
+                <a14:useLocalDpi xmlns:a14="http://schemas.microsoft.com/office/drawing/2010/main" val="0"/>
+              </a:ext>
+            </a:extLst>
+          </a:blip>
+          <a:srcRect/>
+          <a:stretch>
+            <a:fillRect/>
+          </a:stretch>
+        </p:blipFill>
+        <p:spPr bwMode="auto">
+          <a:xfrm>
+            <a:off x="7530750" y="1483963"/>
+            <a:ext cx="1043175" cy="1043175"/>
           </a:xfrm>
           <a:prstGeom prst="rect">
             <a:avLst/>

</xml_diff>